<commit_message>
Adding architecture description to PPTX
</commit_message>
<xml_diff>
--- a/docs/deployment_guide/images/rdgateway-architecture-diagram.pptx
+++ b/docs/deployment_guide/images/rdgateway-architecture-diagram.pptx
@@ -6,6 +6,7 @@
   </p:sldMasterIdLst>
   <p:sldIdLst>
     <p:sldId id="256" r:id="rId2"/>
+    <p:sldId id="257" r:id="rId3"/>
   </p:sldIdLst>
   <p:sldSz cx="12192000" cy="6858000"/>
   <p:notesSz cx="6858000" cy="9144000"/>
@@ -154,10 +155,9 @@
           </a:lstStyle>
           <a:p>
             <a:r>
-              <a:rPr lang="en-US" smtClean="0"/>
+              <a:rPr lang="en-US"/>
               <a:t>Click to edit Master title style</a:t>
             </a:r>
-            <a:endParaRPr lang="en-US"/>
           </a:p>
         </p:txBody>
       </p:sp>
@@ -219,10 +219,9 @@
           </a:lstStyle>
           <a:p>
             <a:r>
-              <a:rPr lang="en-US" smtClean="0"/>
+              <a:rPr lang="en-US"/>
               <a:t>Click to edit Master subtitle style</a:t>
             </a:r>
-            <a:endParaRPr lang="en-US"/>
           </a:p>
         </p:txBody>
       </p:sp>
@@ -243,7 +242,7 @@
           <a:p>
             <a:fld id="{DEB1E20B-6FC3-4B55-AE68-5D68E1FCEE07}" type="datetimeFigureOut">
               <a:rPr lang="en-US" smtClean="0"/>
-              <a:t>1/28/2021</a:t>
+              <a:t>8/31/2023</a:t>
             </a:fld>
             <a:endParaRPr lang="en-US"/>
           </a:p>
@@ -337,10 +336,9 @@
           <a:lstStyle/>
           <a:p>
             <a:r>
-              <a:rPr lang="en-US" smtClean="0"/>
+              <a:rPr lang="en-US"/>
               <a:t>Click to edit Master title style</a:t>
             </a:r>
-            <a:endParaRPr lang="en-US"/>
           </a:p>
         </p:txBody>
       </p:sp>
@@ -361,38 +359,37 @@
           <a:p>
             <a:pPr lvl="0"/>
             <a:r>
-              <a:rPr lang="en-US" smtClean="0"/>
+              <a:rPr lang="en-US"/>
               <a:t>Edit Master text styles</a:t>
             </a:r>
           </a:p>
           <a:p>
             <a:pPr lvl="1"/>
             <a:r>
-              <a:rPr lang="en-US" smtClean="0"/>
+              <a:rPr lang="en-US"/>
               <a:t>Second level</a:t>
             </a:r>
           </a:p>
           <a:p>
             <a:pPr lvl="2"/>
             <a:r>
-              <a:rPr lang="en-US" smtClean="0"/>
+              <a:rPr lang="en-US"/>
               <a:t>Third level</a:t>
             </a:r>
           </a:p>
           <a:p>
             <a:pPr lvl="3"/>
             <a:r>
-              <a:rPr lang="en-US" smtClean="0"/>
+              <a:rPr lang="en-US"/>
               <a:t>Fourth level</a:t>
             </a:r>
           </a:p>
           <a:p>
             <a:pPr lvl="4"/>
             <a:r>
-              <a:rPr lang="en-US" smtClean="0"/>
+              <a:rPr lang="en-US"/>
               <a:t>Fifth level</a:t>
             </a:r>
-            <a:endParaRPr lang="en-US"/>
           </a:p>
         </p:txBody>
       </p:sp>
@@ -413,7 +410,7 @@
           <a:p>
             <a:fld id="{DEB1E20B-6FC3-4B55-AE68-5D68E1FCEE07}" type="datetimeFigureOut">
               <a:rPr lang="en-US" smtClean="0"/>
-              <a:t>1/28/2021</a:t>
+              <a:t>8/31/2023</a:t>
             </a:fld>
             <a:endParaRPr lang="en-US"/>
           </a:p>
@@ -512,10 +509,9 @@
           <a:lstStyle/>
           <a:p>
             <a:r>
-              <a:rPr lang="en-US" smtClean="0"/>
+              <a:rPr lang="en-US"/>
               <a:t>Click to edit Master title style</a:t>
             </a:r>
-            <a:endParaRPr lang="en-US"/>
           </a:p>
         </p:txBody>
       </p:sp>
@@ -541,38 +537,37 @@
           <a:p>
             <a:pPr lvl="0"/>
             <a:r>
-              <a:rPr lang="en-US" smtClean="0"/>
+              <a:rPr lang="en-US"/>
               <a:t>Edit Master text styles</a:t>
             </a:r>
           </a:p>
           <a:p>
             <a:pPr lvl="1"/>
             <a:r>
-              <a:rPr lang="en-US" smtClean="0"/>
+              <a:rPr lang="en-US"/>
               <a:t>Second level</a:t>
             </a:r>
           </a:p>
           <a:p>
             <a:pPr lvl="2"/>
             <a:r>
-              <a:rPr lang="en-US" smtClean="0"/>
+              <a:rPr lang="en-US"/>
               <a:t>Third level</a:t>
             </a:r>
           </a:p>
           <a:p>
             <a:pPr lvl="3"/>
             <a:r>
-              <a:rPr lang="en-US" smtClean="0"/>
+              <a:rPr lang="en-US"/>
               <a:t>Fourth level</a:t>
             </a:r>
           </a:p>
           <a:p>
             <a:pPr lvl="4"/>
             <a:r>
-              <a:rPr lang="en-US" smtClean="0"/>
+              <a:rPr lang="en-US"/>
               <a:t>Fifth level</a:t>
             </a:r>
-            <a:endParaRPr lang="en-US"/>
           </a:p>
         </p:txBody>
       </p:sp>
@@ -593,7 +588,7 @@
           <a:p>
             <a:fld id="{DEB1E20B-6FC3-4B55-AE68-5D68E1FCEE07}" type="datetimeFigureOut">
               <a:rPr lang="en-US" smtClean="0"/>
-              <a:t>1/28/2021</a:t>
+              <a:t>8/31/2023</a:t>
             </a:fld>
             <a:endParaRPr lang="en-US"/>
           </a:p>
@@ -687,10 +682,9 @@
           <a:lstStyle/>
           <a:p>
             <a:r>
-              <a:rPr lang="en-US" smtClean="0"/>
+              <a:rPr lang="en-US"/>
               <a:t>Click to edit Master title style</a:t>
             </a:r>
-            <a:endParaRPr lang="en-US"/>
           </a:p>
         </p:txBody>
       </p:sp>
@@ -711,38 +705,37 @@
           <a:p>
             <a:pPr lvl="0"/>
             <a:r>
-              <a:rPr lang="en-US" smtClean="0"/>
+              <a:rPr lang="en-US"/>
               <a:t>Edit Master text styles</a:t>
             </a:r>
           </a:p>
           <a:p>
             <a:pPr lvl="1"/>
             <a:r>
-              <a:rPr lang="en-US" smtClean="0"/>
+              <a:rPr lang="en-US"/>
               <a:t>Second level</a:t>
             </a:r>
           </a:p>
           <a:p>
             <a:pPr lvl="2"/>
             <a:r>
-              <a:rPr lang="en-US" smtClean="0"/>
+              <a:rPr lang="en-US"/>
               <a:t>Third level</a:t>
             </a:r>
           </a:p>
           <a:p>
             <a:pPr lvl="3"/>
             <a:r>
-              <a:rPr lang="en-US" smtClean="0"/>
+              <a:rPr lang="en-US"/>
               <a:t>Fourth level</a:t>
             </a:r>
           </a:p>
           <a:p>
             <a:pPr lvl="4"/>
             <a:r>
-              <a:rPr lang="en-US" smtClean="0"/>
+              <a:rPr lang="en-US"/>
               <a:t>Fifth level</a:t>
             </a:r>
-            <a:endParaRPr lang="en-US"/>
           </a:p>
         </p:txBody>
       </p:sp>
@@ -763,7 +756,7 @@
           <a:p>
             <a:fld id="{DEB1E20B-6FC3-4B55-AE68-5D68E1FCEE07}" type="datetimeFigureOut">
               <a:rPr lang="en-US" smtClean="0"/>
-              <a:t>1/28/2021</a:t>
+              <a:t>8/31/2023</a:t>
             </a:fld>
             <a:endParaRPr lang="en-US"/>
           </a:p>
@@ -866,10 +859,9 @@
           </a:lstStyle>
           <a:p>
             <a:r>
-              <a:rPr lang="en-US" smtClean="0"/>
+              <a:rPr lang="en-US"/>
               <a:t>Click to edit Master title style</a:t>
             </a:r>
-            <a:endParaRPr lang="en-US"/>
           </a:p>
         </p:txBody>
       </p:sp>
@@ -986,7 +978,7 @@
           <a:p>
             <a:pPr lvl="0"/>
             <a:r>
-              <a:rPr lang="en-US" smtClean="0"/>
+              <a:rPr lang="en-US"/>
               <a:t>Edit Master text styles</a:t>
             </a:r>
           </a:p>
@@ -1009,7 +1001,7 @@
           <a:p>
             <a:fld id="{DEB1E20B-6FC3-4B55-AE68-5D68E1FCEE07}" type="datetimeFigureOut">
               <a:rPr lang="en-US" smtClean="0"/>
-              <a:t>1/28/2021</a:t>
+              <a:t>8/31/2023</a:t>
             </a:fld>
             <a:endParaRPr lang="en-US"/>
           </a:p>
@@ -1103,10 +1095,9 @@
           <a:lstStyle/>
           <a:p>
             <a:r>
-              <a:rPr lang="en-US" smtClean="0"/>
+              <a:rPr lang="en-US"/>
               <a:t>Click to edit Master title style</a:t>
             </a:r>
-            <a:endParaRPr lang="en-US"/>
           </a:p>
         </p:txBody>
       </p:sp>
@@ -1132,38 +1123,37 @@
           <a:p>
             <a:pPr lvl="0"/>
             <a:r>
-              <a:rPr lang="en-US" smtClean="0"/>
+              <a:rPr lang="en-US"/>
               <a:t>Edit Master text styles</a:t>
             </a:r>
           </a:p>
           <a:p>
             <a:pPr lvl="1"/>
             <a:r>
-              <a:rPr lang="en-US" smtClean="0"/>
+              <a:rPr lang="en-US"/>
               <a:t>Second level</a:t>
             </a:r>
           </a:p>
           <a:p>
             <a:pPr lvl="2"/>
             <a:r>
-              <a:rPr lang="en-US" smtClean="0"/>
+              <a:rPr lang="en-US"/>
               <a:t>Third level</a:t>
             </a:r>
           </a:p>
           <a:p>
             <a:pPr lvl="3"/>
             <a:r>
-              <a:rPr lang="en-US" smtClean="0"/>
+              <a:rPr lang="en-US"/>
               <a:t>Fourth level</a:t>
             </a:r>
           </a:p>
           <a:p>
             <a:pPr lvl="4"/>
             <a:r>
-              <a:rPr lang="en-US" smtClean="0"/>
+              <a:rPr lang="en-US"/>
               <a:t>Fifth level</a:t>
             </a:r>
-            <a:endParaRPr lang="en-US"/>
           </a:p>
         </p:txBody>
       </p:sp>
@@ -1189,38 +1179,37 @@
           <a:p>
             <a:pPr lvl="0"/>
             <a:r>
-              <a:rPr lang="en-US" smtClean="0"/>
+              <a:rPr lang="en-US"/>
               <a:t>Edit Master text styles</a:t>
             </a:r>
           </a:p>
           <a:p>
             <a:pPr lvl="1"/>
             <a:r>
-              <a:rPr lang="en-US" smtClean="0"/>
+              <a:rPr lang="en-US"/>
               <a:t>Second level</a:t>
             </a:r>
           </a:p>
           <a:p>
             <a:pPr lvl="2"/>
             <a:r>
-              <a:rPr lang="en-US" smtClean="0"/>
+              <a:rPr lang="en-US"/>
               <a:t>Third level</a:t>
             </a:r>
           </a:p>
           <a:p>
             <a:pPr lvl="3"/>
             <a:r>
-              <a:rPr lang="en-US" smtClean="0"/>
+              <a:rPr lang="en-US"/>
               <a:t>Fourth level</a:t>
             </a:r>
           </a:p>
           <a:p>
             <a:pPr lvl="4"/>
             <a:r>
-              <a:rPr lang="en-US" smtClean="0"/>
+              <a:rPr lang="en-US"/>
               <a:t>Fifth level</a:t>
             </a:r>
-            <a:endParaRPr lang="en-US"/>
           </a:p>
         </p:txBody>
       </p:sp>
@@ -1241,7 +1230,7 @@
           <a:p>
             <a:fld id="{DEB1E20B-6FC3-4B55-AE68-5D68E1FCEE07}" type="datetimeFigureOut">
               <a:rPr lang="en-US" smtClean="0"/>
-              <a:t>1/28/2021</a:t>
+              <a:t>8/31/2023</a:t>
             </a:fld>
             <a:endParaRPr lang="en-US"/>
           </a:p>
@@ -1340,10 +1329,9 @@
           <a:lstStyle/>
           <a:p>
             <a:r>
-              <a:rPr lang="en-US" smtClean="0"/>
+              <a:rPr lang="en-US"/>
               <a:t>Click to edit Master title style</a:t>
             </a:r>
-            <a:endParaRPr lang="en-US"/>
           </a:p>
         </p:txBody>
       </p:sp>
@@ -1406,7 +1394,7 @@
           <a:p>
             <a:pPr lvl="0"/>
             <a:r>
-              <a:rPr lang="en-US" smtClean="0"/>
+              <a:rPr lang="en-US"/>
               <a:t>Edit Master text styles</a:t>
             </a:r>
           </a:p>
@@ -1434,38 +1422,37 @@
           <a:p>
             <a:pPr lvl="0"/>
             <a:r>
-              <a:rPr lang="en-US" smtClean="0"/>
+              <a:rPr lang="en-US"/>
               <a:t>Edit Master text styles</a:t>
             </a:r>
           </a:p>
           <a:p>
             <a:pPr lvl="1"/>
             <a:r>
-              <a:rPr lang="en-US" smtClean="0"/>
+              <a:rPr lang="en-US"/>
               <a:t>Second level</a:t>
             </a:r>
           </a:p>
           <a:p>
             <a:pPr lvl="2"/>
             <a:r>
-              <a:rPr lang="en-US" smtClean="0"/>
+              <a:rPr lang="en-US"/>
               <a:t>Third level</a:t>
             </a:r>
           </a:p>
           <a:p>
             <a:pPr lvl="3"/>
             <a:r>
-              <a:rPr lang="en-US" smtClean="0"/>
+              <a:rPr lang="en-US"/>
               <a:t>Fourth level</a:t>
             </a:r>
           </a:p>
           <a:p>
             <a:pPr lvl="4"/>
             <a:r>
-              <a:rPr lang="en-US" smtClean="0"/>
+              <a:rPr lang="en-US"/>
               <a:t>Fifth level</a:t>
             </a:r>
-            <a:endParaRPr lang="en-US"/>
           </a:p>
         </p:txBody>
       </p:sp>
@@ -1528,7 +1515,7 @@
           <a:p>
             <a:pPr lvl="0"/>
             <a:r>
-              <a:rPr lang="en-US" smtClean="0"/>
+              <a:rPr lang="en-US"/>
               <a:t>Edit Master text styles</a:t>
             </a:r>
           </a:p>
@@ -1556,38 +1543,37 @@
           <a:p>
             <a:pPr lvl="0"/>
             <a:r>
-              <a:rPr lang="en-US" smtClean="0"/>
+              <a:rPr lang="en-US"/>
               <a:t>Edit Master text styles</a:t>
             </a:r>
           </a:p>
           <a:p>
             <a:pPr lvl="1"/>
             <a:r>
-              <a:rPr lang="en-US" smtClean="0"/>
+              <a:rPr lang="en-US"/>
               <a:t>Second level</a:t>
             </a:r>
           </a:p>
           <a:p>
             <a:pPr lvl="2"/>
             <a:r>
-              <a:rPr lang="en-US" smtClean="0"/>
+              <a:rPr lang="en-US"/>
               <a:t>Third level</a:t>
             </a:r>
           </a:p>
           <a:p>
             <a:pPr lvl="3"/>
             <a:r>
-              <a:rPr lang="en-US" smtClean="0"/>
+              <a:rPr lang="en-US"/>
               <a:t>Fourth level</a:t>
             </a:r>
           </a:p>
           <a:p>
             <a:pPr lvl="4"/>
             <a:r>
-              <a:rPr lang="en-US" smtClean="0"/>
+              <a:rPr lang="en-US"/>
               <a:t>Fifth level</a:t>
             </a:r>
-            <a:endParaRPr lang="en-US"/>
           </a:p>
         </p:txBody>
       </p:sp>
@@ -1608,7 +1594,7 @@
           <a:p>
             <a:fld id="{DEB1E20B-6FC3-4B55-AE68-5D68E1FCEE07}" type="datetimeFigureOut">
               <a:rPr lang="en-US" smtClean="0"/>
-              <a:t>1/28/2021</a:t>
+              <a:t>8/31/2023</a:t>
             </a:fld>
             <a:endParaRPr lang="en-US"/>
           </a:p>
@@ -1702,10 +1688,9 @@
           <a:lstStyle/>
           <a:p>
             <a:r>
-              <a:rPr lang="en-US" smtClean="0"/>
+              <a:rPr lang="en-US"/>
               <a:t>Click to edit Master title style</a:t>
             </a:r>
-            <a:endParaRPr lang="en-US"/>
           </a:p>
         </p:txBody>
       </p:sp>
@@ -1726,7 +1711,7 @@
           <a:p>
             <a:fld id="{DEB1E20B-6FC3-4B55-AE68-5D68E1FCEE07}" type="datetimeFigureOut">
               <a:rPr lang="en-US" smtClean="0"/>
-              <a:t>1/28/2021</a:t>
+              <a:t>8/31/2023</a:t>
             </a:fld>
             <a:endParaRPr lang="en-US"/>
           </a:p>
@@ -1821,7 +1806,7 @@
           <a:p>
             <a:fld id="{DEB1E20B-6FC3-4B55-AE68-5D68E1FCEE07}" type="datetimeFigureOut">
               <a:rPr lang="en-US" smtClean="0"/>
-              <a:t>1/28/2021</a:t>
+              <a:t>8/31/2023</a:t>
             </a:fld>
             <a:endParaRPr lang="en-US"/>
           </a:p>
@@ -1924,10 +1909,9 @@
           </a:lstStyle>
           <a:p>
             <a:r>
-              <a:rPr lang="en-US" smtClean="0"/>
+              <a:rPr lang="en-US"/>
               <a:t>Click to edit Master title style</a:t>
             </a:r>
-            <a:endParaRPr lang="en-US"/>
           </a:p>
         </p:txBody>
       </p:sp>
@@ -1981,38 +1965,37 @@
           <a:p>
             <a:pPr lvl="0"/>
             <a:r>
-              <a:rPr lang="en-US" smtClean="0"/>
+              <a:rPr lang="en-US"/>
               <a:t>Edit Master text styles</a:t>
             </a:r>
           </a:p>
           <a:p>
             <a:pPr lvl="1"/>
             <a:r>
-              <a:rPr lang="en-US" smtClean="0"/>
+              <a:rPr lang="en-US"/>
               <a:t>Second level</a:t>
             </a:r>
           </a:p>
           <a:p>
             <a:pPr lvl="2"/>
             <a:r>
-              <a:rPr lang="en-US" smtClean="0"/>
+              <a:rPr lang="en-US"/>
               <a:t>Third level</a:t>
             </a:r>
           </a:p>
           <a:p>
             <a:pPr lvl="3"/>
             <a:r>
-              <a:rPr lang="en-US" smtClean="0"/>
+              <a:rPr lang="en-US"/>
               <a:t>Fourth level</a:t>
             </a:r>
           </a:p>
           <a:p>
             <a:pPr lvl="4"/>
             <a:r>
-              <a:rPr lang="en-US" smtClean="0"/>
+              <a:rPr lang="en-US"/>
               <a:t>Fifth level</a:t>
             </a:r>
-            <a:endParaRPr lang="en-US"/>
           </a:p>
         </p:txBody>
       </p:sp>
@@ -2075,7 +2058,7 @@
           <a:p>
             <a:pPr lvl="0"/>
             <a:r>
-              <a:rPr lang="en-US" smtClean="0"/>
+              <a:rPr lang="en-US"/>
               <a:t>Edit Master text styles</a:t>
             </a:r>
           </a:p>
@@ -2098,7 +2081,7 @@
           <a:p>
             <a:fld id="{DEB1E20B-6FC3-4B55-AE68-5D68E1FCEE07}" type="datetimeFigureOut">
               <a:rPr lang="en-US" smtClean="0"/>
-              <a:t>1/28/2021</a:t>
+              <a:t>8/31/2023</a:t>
             </a:fld>
             <a:endParaRPr lang="en-US"/>
           </a:p>
@@ -2201,10 +2184,9 @@
           </a:lstStyle>
           <a:p>
             <a:r>
-              <a:rPr lang="en-US" smtClean="0"/>
+              <a:rPr lang="en-US"/>
               <a:t>Click to edit Master title style</a:t>
             </a:r>
-            <a:endParaRPr lang="en-US"/>
           </a:p>
         </p:txBody>
       </p:sp>
@@ -2328,7 +2310,7 @@
           <a:p>
             <a:pPr lvl="0"/>
             <a:r>
-              <a:rPr lang="en-US" smtClean="0"/>
+              <a:rPr lang="en-US"/>
               <a:t>Edit Master text styles</a:t>
             </a:r>
           </a:p>
@@ -2351,7 +2333,7 @@
           <a:p>
             <a:fld id="{DEB1E20B-6FC3-4B55-AE68-5D68E1FCEE07}" type="datetimeFigureOut">
               <a:rPr lang="en-US" smtClean="0"/>
-              <a:t>1/28/2021</a:t>
+              <a:t>8/31/2023</a:t>
             </a:fld>
             <a:endParaRPr lang="en-US"/>
           </a:p>
@@ -2460,10 +2442,9 @@
           <a:lstStyle/>
           <a:p>
             <a:r>
-              <a:rPr lang="en-US" smtClean="0"/>
+              <a:rPr lang="en-US"/>
               <a:t>Click to edit Master title style</a:t>
             </a:r>
-            <a:endParaRPr lang="en-US"/>
           </a:p>
         </p:txBody>
       </p:sp>
@@ -2494,38 +2475,37 @@
           <a:p>
             <a:pPr lvl="0"/>
             <a:r>
-              <a:rPr lang="en-US" smtClean="0"/>
+              <a:rPr lang="en-US"/>
               <a:t>Edit Master text styles</a:t>
             </a:r>
           </a:p>
           <a:p>
             <a:pPr lvl="1"/>
             <a:r>
-              <a:rPr lang="en-US" smtClean="0"/>
+              <a:rPr lang="en-US"/>
               <a:t>Second level</a:t>
             </a:r>
           </a:p>
           <a:p>
             <a:pPr lvl="2"/>
             <a:r>
-              <a:rPr lang="en-US" smtClean="0"/>
+              <a:rPr lang="en-US"/>
               <a:t>Third level</a:t>
             </a:r>
           </a:p>
           <a:p>
             <a:pPr lvl="3"/>
             <a:r>
-              <a:rPr lang="en-US" smtClean="0"/>
+              <a:rPr lang="en-US"/>
               <a:t>Fourth level</a:t>
             </a:r>
           </a:p>
           <a:p>
             <a:pPr lvl="4"/>
             <a:r>
-              <a:rPr lang="en-US" smtClean="0"/>
+              <a:rPr lang="en-US"/>
               <a:t>Fifth level</a:t>
             </a:r>
-            <a:endParaRPr lang="en-US"/>
           </a:p>
         </p:txBody>
       </p:sp>
@@ -2564,7 +2544,7 @@
           <a:p>
             <a:fld id="{DEB1E20B-6FC3-4B55-AE68-5D68E1FCEE07}" type="datetimeFigureOut">
               <a:rPr lang="en-US" smtClean="0"/>
-              <a:t>1/28/2021</a:t>
+              <a:t>8/31/2023</a:t>
             </a:fld>
             <a:endParaRPr lang="en-US"/>
           </a:p>
@@ -3391,13 +3371,7 @@
           <p:nvPr/>
         </p:nvPicPr>
         <p:blipFill>
-          <a:blip r:embed="rId2">
-            <a:extLst>
-              <a:ext uri="{96DAC541-7B7A-43D3-8B79-37D633B846F1}">
-                <asvg:svgBlip xmlns:asvg="http://schemas.microsoft.com/office/drawing/2016/SVG/main" xmlns="" r:embed="rId8"/>
-              </a:ext>
-            </a:extLst>
-          </a:blip>
+          <a:blip r:embed="rId2"/>
           <a:stretch>
             <a:fillRect/>
           </a:stretch>
@@ -3427,13 +3401,7 @@
           <p:nvPr/>
         </p:nvPicPr>
         <p:blipFill>
-          <a:blip r:embed="rId9">
-            <a:extLst>
-              <a:ext uri="{96DAC541-7B7A-43D3-8B79-37D633B846F1}">
-                <asvg:svgBlip xmlns:asvg="http://schemas.microsoft.com/office/drawing/2016/SVG/main" xmlns="" r:embed="rId10"/>
-              </a:ext>
-            </a:extLst>
-          </a:blip>
+          <a:blip r:embed="rId3"/>
           <a:stretch>
             <a:fillRect/>
           </a:stretch>
@@ -3463,13 +3431,7 @@
           <p:nvPr/>
         </p:nvPicPr>
         <p:blipFill>
-          <a:blip r:embed="rId11">
-            <a:extLst>
-              <a:ext uri="{96DAC541-7B7A-43D3-8B79-37D633B846F1}">
-                <asvg:svgBlip xmlns:asvg="http://schemas.microsoft.com/office/drawing/2016/SVG/main" xmlns="" r:embed="rId12"/>
-              </a:ext>
-            </a:extLst>
-          </a:blip>
+          <a:blip r:embed="rId4"/>
           <a:stretch>
             <a:fillRect/>
           </a:stretch>
@@ -3499,13 +3461,7 @@
           <p:nvPr/>
         </p:nvPicPr>
         <p:blipFill>
-          <a:blip r:embed="rId13">
-            <a:extLst>
-              <a:ext uri="{96DAC541-7B7A-43D3-8B79-37D633B846F1}">
-                <asvg:svgBlip xmlns:asvg="http://schemas.microsoft.com/office/drawing/2016/SVG/main" xmlns="" r:embed="rId14"/>
-              </a:ext>
-            </a:extLst>
-          </a:blip>
+          <a:blip r:embed="rId5"/>
           <a:stretch>
             <a:fillRect/>
           </a:stretch>
@@ -3671,13 +3627,7 @@
           <p:nvPr/>
         </p:nvPicPr>
         <p:blipFill>
-          <a:blip r:embed="rId11">
-            <a:extLst>
-              <a:ext uri="{96DAC541-7B7A-43D3-8B79-37D633B846F1}">
-                <asvg:svgBlip xmlns:asvg="http://schemas.microsoft.com/office/drawing/2016/SVG/main" xmlns="" r:embed="rId12"/>
-              </a:ext>
-            </a:extLst>
-          </a:blip>
+          <a:blip r:embed="rId4"/>
           <a:stretch>
             <a:fillRect/>
           </a:stretch>
@@ -3707,13 +3657,7 @@
           <p:nvPr/>
         </p:nvPicPr>
         <p:blipFill>
-          <a:blip r:embed="rId13">
-            <a:extLst>
-              <a:ext uri="{96DAC541-7B7A-43D3-8B79-37D633B846F1}">
-                <asvg:svgBlip xmlns:asvg="http://schemas.microsoft.com/office/drawing/2016/SVG/main" xmlns="" r:embed="rId14"/>
-              </a:ext>
-            </a:extLst>
-          </a:blip>
+          <a:blip r:embed="rId5"/>
           <a:stretch>
             <a:fillRect/>
           </a:stretch>
@@ -3782,13 +3726,7 @@
           <p:nvPr/>
         </p:nvPicPr>
         <p:blipFill>
-          <a:blip r:embed="rId15">
-            <a:extLst>
-              <a:ext uri="{96DAC541-7B7A-43D3-8B79-37D633B846F1}">
-                <asvg:svgBlip xmlns:asvg="http://schemas.microsoft.com/office/drawing/2016/SVG/main" xmlns="" r:embed="rId16"/>
-              </a:ext>
-            </a:extLst>
-          </a:blip>
+          <a:blip r:embed="rId6"/>
           <a:stretch>
             <a:fillRect/>
           </a:stretch>
@@ -3857,13 +3795,7 @@
           <p:nvPr/>
         </p:nvPicPr>
         <p:blipFill>
-          <a:blip r:embed="rId15">
-            <a:extLst>
-              <a:ext uri="{96DAC541-7B7A-43D3-8B79-37D633B846F1}">
-                <asvg:svgBlip xmlns:asvg="http://schemas.microsoft.com/office/drawing/2016/SVG/main" xmlns="" r:embed="rId16"/>
-              </a:ext>
-            </a:extLst>
-          </a:blip>
+          <a:blip r:embed="rId6"/>
           <a:stretch>
             <a:fillRect/>
           </a:stretch>
@@ -3893,13 +3825,7 @@
           <p:nvPr/>
         </p:nvPicPr>
         <p:blipFill>
-          <a:blip r:embed="rId17">
-            <a:extLst>
-              <a:ext uri="{96DAC541-7B7A-43D3-8B79-37D633B846F1}">
-                <asvg:svgBlip xmlns:asvg="http://schemas.microsoft.com/office/drawing/2016/SVG/main" xmlns="" r:embed="rId4"/>
-              </a:ext>
-            </a:extLst>
-          </a:blip>
+          <a:blip r:embed="rId7"/>
           <a:stretch>
             <a:fillRect/>
           </a:stretch>
@@ -3944,16 +3870,12 @@
           <a:p>
             <a:pPr algn="ctr"/>
             <a:r>
-              <a:rPr lang="en-US" sz="1200" dirty="0" smtClean="0">
+              <a:rPr lang="en-US" sz="1200" dirty="0">
                 <a:latin typeface="Arial" panose="020B0604020202020204" pitchFamily="34" charset="0"/>
                 <a:cs typeface="Arial" panose="020B0604020202020204" pitchFamily="34" charset="0"/>
               </a:rPr>
               <a:t>RD Gateway</a:t>
             </a:r>
-            <a:endParaRPr lang="en-US" sz="1200" dirty="0">
-              <a:latin typeface="Arial" panose="020B0604020202020204" pitchFamily="34" charset="0"/>
-              <a:cs typeface="Arial" panose="020B0604020202020204" pitchFamily="34" charset="0"/>
-            </a:endParaRPr>
           </a:p>
         </p:txBody>
       </p:sp>
@@ -4228,16 +4150,12 @@
           <a:p>
             <a:pPr algn="ctr"/>
             <a:r>
-              <a:rPr lang="en-US" sz="1200" dirty="0" smtClean="0">
+              <a:rPr lang="en-US" sz="1200" dirty="0">
                 <a:latin typeface="Arial" panose="020B0604020202020204" pitchFamily="34" charset="0"/>
                 <a:cs typeface="Arial" panose="020B0604020202020204" pitchFamily="34" charset="0"/>
               </a:rPr>
               <a:t>RD Gateway</a:t>
             </a:r>
-            <a:endParaRPr lang="en-US" sz="1200" dirty="0">
-              <a:latin typeface="Arial" panose="020B0604020202020204" pitchFamily="34" charset="0"/>
-              <a:cs typeface="Arial" panose="020B0604020202020204" pitchFamily="34" charset="0"/>
-            </a:endParaRPr>
           </a:p>
         </p:txBody>
       </p:sp>
@@ -4256,19 +4174,16 @@
           <p:nvPr/>
         </p:nvPicPr>
         <p:blipFill>
-          <a:blip r:embed="rId18">
+          <a:blip r:embed="rId8">
             <a:extLst>
               <a:ext uri="{BEBA8EAE-BF5A-486C-A8C5-ECC9F3942E4B}">
                 <a14:imgProps xmlns:a14="http://schemas.microsoft.com/office/drawing/2010/main">
-                  <a14:imgLayer r:embed="rId19">
+                  <a14:imgLayer r:embed="rId9">
                     <a14:imgEffect>
                       <a14:artisticPhotocopy/>
                     </a14:imgEffect>
                   </a14:imgLayer>
                 </a14:imgProps>
-              </a:ext>
-              <a:ext uri="{96DAC541-7B7A-43D3-8B79-37D633B846F1}">
-                <asvg:svgBlip xmlns="" xmlns:asvg="http://schemas.microsoft.com/office/drawing/2016/SVG/main" r:embed="rId27"/>
               </a:ext>
             </a:extLst>
           </a:blip>
@@ -4442,40 +4357,19 @@
                 <a:ea typeface="Amazon Ember" panose="020B0603020204020204" pitchFamily="34" charset="0"/>
                 <a:cs typeface="Arial" panose="020B0604020202020204" pitchFamily="34" charset="0"/>
               </a:rPr>
-              <a:t>Network </a:t>
-            </a:r>
-            <a:r>
-              <a:rPr lang="en-US" altLang="en-US" sz="1200" dirty="0" smtClean="0">
+              <a:t>Network Load </a:t>
+            </a:r>
+          </a:p>
+          <a:p>
+            <a:pPr algn="ctr" eaLnBrk="1" hangingPunct="1"/>
+            <a:r>
+              <a:rPr lang="en-US" altLang="en-US" sz="1200" dirty="0">
                 <a:latin typeface="Arial" panose="020B0604020202020204" pitchFamily="34" charset="0"/>
                 <a:ea typeface="Amazon Ember" panose="020B0603020204020204" pitchFamily="34" charset="0"/>
                 <a:cs typeface="Arial" panose="020B0604020202020204" pitchFamily="34" charset="0"/>
               </a:rPr>
-              <a:t>Load </a:t>
-            </a:r>
-          </a:p>
-          <a:p>
-            <a:pPr algn="ctr" eaLnBrk="1" hangingPunct="1"/>
-            <a:r>
-              <a:rPr lang="en-US" altLang="en-US" sz="1200" dirty="0" smtClean="0">
-                <a:latin typeface="Arial" panose="020B0604020202020204" pitchFamily="34" charset="0"/>
-                <a:ea typeface="Amazon Ember" panose="020B0603020204020204" pitchFamily="34" charset="0"/>
-                <a:cs typeface="Arial" panose="020B0604020202020204" pitchFamily="34" charset="0"/>
-              </a:rPr>
-              <a:t>B</a:t>
-            </a:r>
-            <a:r>
-              <a:rPr lang="en-US" altLang="en-US" sz="1200" dirty="0" smtClean="0">
-                <a:latin typeface="Arial" panose="020B0604020202020204" pitchFamily="34" charset="0"/>
-                <a:ea typeface="Amazon Ember" panose="020B0603020204020204" pitchFamily="34" charset="0"/>
-                <a:cs typeface="Arial" panose="020B0604020202020204" pitchFamily="34" charset="0"/>
-              </a:rPr>
-              <a:t>alancer</a:t>
-            </a:r>
-            <a:endParaRPr lang="en-US" altLang="en-US" sz="1200" dirty="0">
-              <a:latin typeface="Arial" panose="020B0604020202020204" pitchFamily="34" charset="0"/>
-              <a:ea typeface="Amazon Ember" panose="020B0603020204020204" pitchFamily="34" charset="0"/>
-              <a:cs typeface="Arial" panose="020B0604020202020204" pitchFamily="34" charset="0"/>
-            </a:endParaRPr>
+              <a:t>Balancer</a:t>
+            </a:r>
           </a:p>
         </p:txBody>
       </p:sp>
@@ -4494,7 +4388,7 @@
           <p:nvPr/>
         </p:nvPicPr>
         <p:blipFill>
-          <a:blip r:embed="rId28" cstate="print">
+          <a:blip r:embed="rId10" cstate="print">
             <a:extLst>
               <a:ext uri="{28A0092B-C50C-407E-A947-70E740481C1C}">
                 <a14:useLocalDpi xmlns:a14="http://schemas.microsoft.com/office/drawing/2010/main" val="0"/>
@@ -4554,7 +4448,7 @@
           <p:nvPr/>
         </p:nvPicPr>
         <p:blipFill>
-          <a:blip r:embed="rId29" cstate="print">
+          <a:blip r:embed="rId11" cstate="print">
             <a:extLst>
               <a:ext uri="{28A0092B-C50C-407E-A947-70E740481C1C}">
                 <a14:useLocalDpi xmlns:a14="http://schemas.microsoft.com/office/drawing/2010/main" val="0"/>
@@ -4614,7 +4508,7 @@
           <p:nvPr/>
         </p:nvPicPr>
         <p:blipFill>
-          <a:blip r:embed="rId30" cstate="print">
+          <a:blip r:embed="rId12" cstate="print">
             <a:extLst>
               <a:ext uri="{28A0092B-C50C-407E-A947-70E740481C1C}">
                 <a14:useLocalDpi xmlns:a14="http://schemas.microsoft.com/office/drawing/2010/main" val="0"/>
@@ -4674,7 +4568,7 @@
           <p:nvPr/>
         </p:nvPicPr>
         <p:blipFill>
-          <a:blip r:embed="rId31" cstate="print">
+          <a:blip r:embed="rId13" cstate="print">
             <a:extLst>
               <a:ext uri="{28A0092B-C50C-407E-A947-70E740481C1C}">
                 <a14:useLocalDpi xmlns:a14="http://schemas.microsoft.com/office/drawing/2010/main" val="0"/>
@@ -4734,7 +4628,7 @@
           <p:nvPr/>
         </p:nvPicPr>
         <p:blipFill>
-          <a:blip r:embed="rId32" cstate="print">
+          <a:blip r:embed="rId14" cstate="print">
             <a:extLst>
               <a:ext uri="{28A0092B-C50C-407E-A947-70E740481C1C}">
                 <a14:useLocalDpi xmlns:a14="http://schemas.microsoft.com/office/drawing/2010/main" val="0"/>
@@ -4885,16 +4779,12 @@
           <a:p>
             <a:pPr algn="ctr"/>
             <a:r>
-              <a:rPr lang="en-US" sz="1200" dirty="0" smtClean="0">
+              <a:rPr lang="en-US" sz="1200" dirty="0">
                 <a:latin typeface="Arial" panose="020B0604020202020204" pitchFamily="34" charset="0"/>
                 <a:cs typeface="Arial" panose="020B0604020202020204" pitchFamily="34" charset="0"/>
               </a:rPr>
               <a:t>Internet gateway</a:t>
             </a:r>
-            <a:endParaRPr lang="en-US" sz="1200" dirty="0">
-              <a:latin typeface="Arial" panose="020B0604020202020204" pitchFamily="34" charset="0"/>
-              <a:cs typeface="Arial" panose="020B0604020202020204" pitchFamily="34" charset="0"/>
-            </a:endParaRPr>
           </a:p>
         </p:txBody>
       </p:sp>
@@ -5094,6 +4984,532 @@
     <p:extLst>
       <p:ext uri="{BB962C8B-B14F-4D97-AF65-F5344CB8AC3E}">
         <p14:creationId xmlns:p14="http://schemas.microsoft.com/office/powerpoint/2010/main" val="902251378"/>
+      </p:ext>
+    </p:extLst>
+  </p:cSld>
+  <p:clrMapOvr>
+    <a:masterClrMapping/>
+  </p:clrMapOvr>
+</p:sld>
+</file>
+
+<file path=ppt/slides/slide2.xml><?xml version="1.0" encoding="utf-8"?>
+<p:sld xmlns:a="http://schemas.openxmlformats.org/drawingml/2006/main" xmlns:r="http://schemas.openxmlformats.org/officeDocument/2006/relationships" xmlns:p="http://schemas.openxmlformats.org/presentationml/2006/main">
+  <p:cSld>
+    <p:spTree>
+      <p:nvGrpSpPr>
+        <p:cNvPr id="1" name=""/>
+        <p:cNvGrpSpPr/>
+        <p:nvPr/>
+      </p:nvGrpSpPr>
+      <p:grpSpPr>
+        <a:xfrm>
+          <a:off x="0" y="0"/>
+          <a:ext cx="0" cy="0"/>
+          <a:chOff x="0" y="0"/>
+          <a:chExt cx="0" cy="0"/>
+        </a:xfrm>
+      </p:grpSpPr>
+      <p:sp>
+        <p:nvSpPr>
+          <p:cNvPr id="3" name="Rectangle 1">
+            <a:extLst>
+              <a:ext uri="{FF2B5EF4-FFF2-40B4-BE49-F238E27FC236}">
+                <a16:creationId xmlns:a16="http://schemas.microsoft.com/office/drawing/2014/main" id="{C60E0669-36E5-4F8C-BDCA-C799CFD9FA1D}"/>
+              </a:ext>
+            </a:extLst>
+          </p:cNvPr>
+          <p:cNvSpPr>
+            <a:spLocks noChangeArrowheads="1"/>
+          </p:cNvSpPr>
+          <p:nvPr/>
+        </p:nvSpPr>
+        <p:spPr bwMode="auto">
+          <a:xfrm>
+            <a:off x="0" y="303820"/>
+            <a:ext cx="12192000" cy="2646878"/>
+          </a:xfrm>
+          <a:prstGeom prst="rect">
+            <a:avLst/>
+          </a:prstGeom>
+          <a:noFill/>
+          <a:ln>
+            <a:noFill/>
+          </a:ln>
+          <a:effectLst/>
+          <a:extLst>
+            <a:ext uri="{909E8E84-426E-40DD-AFC4-6F175D3DCCD1}">
+              <a14:hiddenFill xmlns:a14="http://schemas.microsoft.com/office/drawing/2010/main">
+                <a:solidFill>
+                  <a:schemeClr val="accent1"/>
+                </a:solidFill>
+              </a14:hiddenFill>
+            </a:ext>
+            <a:ext uri="{91240B29-F687-4F45-9708-019B960494DF}">
+              <a14:hiddenLine xmlns:a14="http://schemas.microsoft.com/office/drawing/2010/main" w="9525">
+                <a:solidFill>
+                  <a:schemeClr val="tx1"/>
+                </a:solidFill>
+                <a:miter lim="800000"/>
+                <a:headEnd/>
+                <a:tailEnd/>
+              </a14:hiddenLine>
+            </a:ext>
+            <a:ext uri="{AF507438-7753-43E0-B8FC-AC1667EBCBE1}">
+              <a14:hiddenEffects xmlns:a14="http://schemas.microsoft.com/office/drawing/2010/main">
+                <a:effectLst>
+                  <a:outerShdw dist="35921" dir="2700000" algn="ctr" rotWithShape="0">
+                    <a:schemeClr val="bg2"/>
+                  </a:outerShdw>
+                </a:effectLst>
+              </a14:hiddenEffects>
+            </a:ext>
+          </a:extLst>
+        </p:spPr>
+        <p:txBody>
+          <a:bodyPr vert="horz" wrap="square" lIns="91440" tIns="45720" rIns="91440" bIns="45720" numCol="1" anchor="ctr" anchorCtr="0" compatLnSpc="1">
+            <a:prstTxWarp prst="textNoShape">
+              <a:avLst/>
+            </a:prstTxWarp>
+            <a:spAutoFit/>
+          </a:bodyPr>
+          <a:lstStyle/>
+          <a:p>
+            <a:pPr marL="0" marR="0" lvl="0" indent="0" algn="l" defTabSz="914400" rtl="0" eaLnBrk="0" fontAlgn="base" latinLnBrk="0" hangingPunct="0">
+              <a:lnSpc>
+                <a:spcPct val="100000"/>
+              </a:lnSpc>
+              <a:spcBef>
+                <a:spcPct val="0"/>
+              </a:spcBef>
+              <a:spcAft>
+                <a:spcPct val="0"/>
+              </a:spcAft>
+              <a:buClrTx/>
+              <a:buSzTx/>
+              <a:buFontTx/>
+              <a:buNone/>
+              <a:tabLst/>
+            </a:pPr>
+            <a:r>
+              <a:rPr kumimoji="0" lang="en-US" altLang="en-US" sz="1000" b="0" i="0" u="none" strike="noStrike" cap="none" normalizeH="0" baseline="0" dirty="0">
+                <a:ln>
+                  <a:noFill/>
+                </a:ln>
+                <a:solidFill>
+                  <a:srgbClr val="000000"/>
+                </a:solidFill>
+                <a:effectLst/>
+                <a:latin typeface="Arial Unicode MS"/>
+              </a:rPr>
+              <a:t>This Partner Solution sets up the following: </a:t>
+            </a:r>
+          </a:p>
+          <a:p>
+            <a:pPr marL="0" marR="0" lvl="0" indent="0" algn="l" defTabSz="914400" rtl="0" eaLnBrk="0" fontAlgn="base" latinLnBrk="0" hangingPunct="0">
+              <a:lnSpc>
+                <a:spcPct val="100000"/>
+              </a:lnSpc>
+              <a:spcBef>
+                <a:spcPct val="0"/>
+              </a:spcBef>
+              <a:spcAft>
+                <a:spcPct val="0"/>
+              </a:spcAft>
+              <a:buClrTx/>
+              <a:buSzTx/>
+              <a:buFontTx/>
+              <a:buNone/>
+              <a:tabLst/>
+            </a:pPr>
+            <a:endParaRPr kumimoji="0" lang="en-US" altLang="en-US" sz="1000" b="0" i="0" u="none" strike="noStrike" cap="none" normalizeH="0" baseline="0" dirty="0">
+              <a:ln>
+                <a:noFill/>
+              </a:ln>
+              <a:solidFill>
+                <a:srgbClr val="000000"/>
+              </a:solidFill>
+              <a:effectLst/>
+              <a:latin typeface="Arial Unicode MS"/>
+            </a:endParaRPr>
+          </a:p>
+          <a:p>
+            <a:pPr marL="171450" marR="0" lvl="0" indent="-171450" algn="l" defTabSz="914400" rtl="0" eaLnBrk="0" fontAlgn="base" latinLnBrk="0" hangingPunct="0">
+              <a:lnSpc>
+                <a:spcPct val="100000"/>
+              </a:lnSpc>
+              <a:spcBef>
+                <a:spcPct val="0"/>
+              </a:spcBef>
+              <a:spcAft>
+                <a:spcPct val="0"/>
+              </a:spcAft>
+              <a:buClrTx/>
+              <a:buSzTx/>
+              <a:buFont typeface="Arial" panose="020B0604020202020204" pitchFamily="34" charset="0"/>
+              <a:buChar char="•"/>
+              <a:tabLst/>
+            </a:pPr>
+            <a:r>
+              <a:rPr kumimoji="0" lang="en-US" altLang="en-US" sz="1000" b="0" i="0" u="none" strike="noStrike" cap="none" normalizeH="0" baseline="0" dirty="0">
+                <a:ln>
+                  <a:noFill/>
+                </a:ln>
+                <a:solidFill>
+                  <a:srgbClr val="000000"/>
+                </a:solidFill>
+                <a:effectLst/>
+                <a:latin typeface="Arial Unicode MS"/>
+              </a:rPr>
+              <a:t>A highly available architecture that spans two Availability Zones.* </a:t>
+            </a:r>
+            <a:endParaRPr lang="en-US" altLang="en-US" sz="1000" dirty="0">
+              <a:solidFill>
+                <a:srgbClr val="000000"/>
+              </a:solidFill>
+              <a:latin typeface="Arial Unicode MS"/>
+            </a:endParaRPr>
+          </a:p>
+          <a:p>
+            <a:pPr marL="171450" marR="0" lvl="0" indent="-171450" algn="l" defTabSz="914400" rtl="0" eaLnBrk="0" fontAlgn="base" latinLnBrk="0" hangingPunct="0">
+              <a:lnSpc>
+                <a:spcPct val="100000"/>
+              </a:lnSpc>
+              <a:spcBef>
+                <a:spcPct val="0"/>
+              </a:spcBef>
+              <a:spcAft>
+                <a:spcPct val="0"/>
+              </a:spcAft>
+              <a:buClrTx/>
+              <a:buSzTx/>
+              <a:buFont typeface="Arial" panose="020B0604020202020204" pitchFamily="34" charset="0"/>
+              <a:buChar char="•"/>
+              <a:tabLst/>
+            </a:pPr>
+            <a:r>
+              <a:rPr kumimoji="0" lang="en-US" altLang="en-US" sz="1000" b="0" i="0" u="none" strike="noStrike" cap="none" normalizeH="0" baseline="0" dirty="0">
+                <a:ln>
+                  <a:noFill/>
+                </a:ln>
+                <a:solidFill>
+                  <a:srgbClr val="000000"/>
+                </a:solidFill>
+                <a:effectLst/>
+                <a:latin typeface="Arial Unicode MS"/>
+              </a:rPr>
+              <a:t>A virtual private cloud (VPC) configured with public and private subnets, according to AWS best practices, to provide you with your own virtual network on AWS.*</a:t>
+            </a:r>
+          </a:p>
+          <a:p>
+            <a:pPr marL="171450" marR="0" lvl="0" indent="-171450" algn="l" defTabSz="914400" rtl="0" eaLnBrk="0" fontAlgn="base" latinLnBrk="0" hangingPunct="0">
+              <a:lnSpc>
+                <a:spcPct val="100000"/>
+              </a:lnSpc>
+              <a:spcBef>
+                <a:spcPct val="0"/>
+              </a:spcBef>
+              <a:spcAft>
+                <a:spcPct val="0"/>
+              </a:spcAft>
+              <a:buClrTx/>
+              <a:buSzTx/>
+              <a:buFont typeface="Arial" panose="020B0604020202020204" pitchFamily="34" charset="0"/>
+              <a:buChar char="•"/>
+              <a:tabLst/>
+            </a:pPr>
+            <a:r>
+              <a:rPr kumimoji="0" lang="en-US" altLang="en-US" sz="1000" b="0" i="0" u="none" strike="noStrike" cap="none" normalizeH="0" baseline="0" dirty="0">
+                <a:ln>
+                  <a:noFill/>
+                </a:ln>
+                <a:solidFill>
+                  <a:srgbClr val="000000"/>
+                </a:solidFill>
+                <a:effectLst/>
+                <a:latin typeface="Arial Unicode MS"/>
+              </a:rPr>
+              <a:t>An internet gateway to allow access to the internet. This gateway is used by the {partner-product-short-name} instances to send and receive traffic.*</a:t>
+            </a:r>
+          </a:p>
+          <a:p>
+            <a:pPr marL="171450" marR="0" lvl="0" indent="-171450" algn="l" defTabSz="914400" rtl="0" eaLnBrk="0" fontAlgn="base" latinLnBrk="0" hangingPunct="0">
+              <a:lnSpc>
+                <a:spcPct val="100000"/>
+              </a:lnSpc>
+              <a:spcBef>
+                <a:spcPct val="0"/>
+              </a:spcBef>
+              <a:spcAft>
+                <a:spcPct val="0"/>
+              </a:spcAft>
+              <a:buClrTx/>
+              <a:buSzTx/>
+              <a:buFont typeface="Arial" panose="020B0604020202020204" pitchFamily="34" charset="0"/>
+              <a:buChar char="•"/>
+              <a:tabLst/>
+            </a:pPr>
+            <a:r>
+              <a:rPr kumimoji="0" lang="en-US" altLang="en-US" sz="1000" b="0" i="0" u="none" strike="noStrike" cap="none" normalizeH="0" baseline="0" dirty="0">
+                <a:ln>
+                  <a:noFill/>
+                </a:ln>
+                <a:solidFill>
+                  <a:srgbClr val="000000"/>
+                </a:solidFill>
+                <a:effectLst/>
+                <a:latin typeface="Arial Unicode MS"/>
+              </a:rPr>
+              <a:t>Managed network address translation (NAT) gateways to allow outbound internet access for resources in the private subnets.</a:t>
+            </a:r>
+          </a:p>
+          <a:p>
+            <a:pPr marL="171450" marR="0" lvl="0" indent="-171450" algn="l" defTabSz="914400" rtl="0" eaLnBrk="0" fontAlgn="base" latinLnBrk="0" hangingPunct="0">
+              <a:lnSpc>
+                <a:spcPct val="100000"/>
+              </a:lnSpc>
+              <a:spcBef>
+                <a:spcPct val="0"/>
+              </a:spcBef>
+              <a:spcAft>
+                <a:spcPct val="0"/>
+              </a:spcAft>
+              <a:buClrTx/>
+              <a:buSzTx/>
+              <a:buFont typeface="Arial" panose="020B0604020202020204" pitchFamily="34" charset="0"/>
+              <a:buChar char="•"/>
+              <a:tabLst/>
+            </a:pPr>
+            <a:r>
+              <a:rPr kumimoji="0" lang="en-US" altLang="en-US" sz="1000" b="0" i="0" u="none" strike="noStrike" cap="none" normalizeH="0" baseline="0" dirty="0">
+                <a:ln>
+                  <a:noFill/>
+                </a:ln>
+                <a:solidFill>
+                  <a:srgbClr val="000000"/>
+                </a:solidFill>
+                <a:effectLst/>
+                <a:latin typeface="Arial Unicode MS"/>
+              </a:rPr>
+              <a:t>In the public subnets:</a:t>
+            </a:r>
+          </a:p>
+          <a:p>
+            <a:pPr marL="628650" lvl="1" indent="-171450" eaLnBrk="0" fontAlgn="base" hangingPunct="0">
+              <a:spcBef>
+                <a:spcPct val="0"/>
+              </a:spcBef>
+              <a:spcAft>
+                <a:spcPct val="0"/>
+              </a:spcAft>
+              <a:buFont typeface="Arial" panose="020B0604020202020204" pitchFamily="34" charset="0"/>
+              <a:buChar char="•"/>
+            </a:pPr>
+            <a:r>
+              <a:rPr kumimoji="0" lang="en-US" altLang="en-US" sz="1000" b="0" i="0" u="none" strike="noStrike" cap="none" normalizeH="0" baseline="0" dirty="0">
+                <a:ln>
+                  <a:noFill/>
+                </a:ln>
+                <a:solidFill>
+                  <a:srgbClr val="000000"/>
+                </a:solidFill>
+                <a:effectLst/>
+                <a:latin typeface="Arial Unicode MS"/>
+              </a:rPr>
+              <a:t>Up to four {partner-product-short-name} instances in an Auto Scaling group to provide secure remote access to instances in the private subnets. Each instance is assigned an Elastic IP address so it’s reachable directly from the internet.</a:t>
+            </a:r>
+          </a:p>
+          <a:p>
+            <a:pPr marL="171450" indent="-171450" eaLnBrk="0" fontAlgn="base" hangingPunct="0">
+              <a:spcBef>
+                <a:spcPct val="0"/>
+              </a:spcBef>
+              <a:spcAft>
+                <a:spcPct val="0"/>
+              </a:spcAft>
+              <a:buFont typeface="Arial" panose="020B0604020202020204" pitchFamily="34" charset="0"/>
+              <a:buChar char="•"/>
+            </a:pPr>
+            <a:r>
+              <a:rPr kumimoji="0" lang="en-US" altLang="en-US" sz="1000" b="0" i="0" u="none" strike="noStrike" cap="none" normalizeH="0" baseline="0" dirty="0">
+                <a:ln>
+                  <a:noFill/>
+                </a:ln>
+                <a:solidFill>
+                  <a:srgbClr val="000000"/>
+                </a:solidFill>
+                <a:effectLst/>
+                <a:latin typeface="Arial Unicode MS"/>
+              </a:rPr>
+              <a:t>A Network Load Balancer to provide RDP access to the {partner-product-short-name} instances.</a:t>
+            </a:r>
+          </a:p>
+          <a:p>
+            <a:pPr marL="171450" indent="-171450" eaLnBrk="0" fontAlgn="base" hangingPunct="0">
+              <a:spcBef>
+                <a:spcPct val="0"/>
+              </a:spcBef>
+              <a:spcAft>
+                <a:spcPct val="0"/>
+              </a:spcAft>
+              <a:buFont typeface="Arial" panose="020B0604020202020204" pitchFamily="34" charset="0"/>
+              <a:buChar char="•"/>
+            </a:pPr>
+            <a:r>
+              <a:rPr kumimoji="0" lang="en-US" altLang="en-US" sz="1000" b="0" i="0" u="none" strike="noStrike" cap="none" normalizeH="0" baseline="0" dirty="0">
+                <a:ln>
+                  <a:noFill/>
+                </a:ln>
+                <a:solidFill>
+                  <a:srgbClr val="000000"/>
+                </a:solidFill>
+                <a:effectLst/>
+                <a:latin typeface="Arial Unicode MS"/>
+              </a:rPr>
+              <a:t>A security group for Windows-based instances that will host the {partner-product-short-name} role, with an ingress rule permitting TCP port 3389 from your administrator IP address. After deployment, you’ll modify the security group ingress rules to configure administrative access through TCP port 443 instead.</a:t>
+            </a:r>
+          </a:p>
+          <a:p>
+            <a:pPr marL="171450" indent="-171450" eaLnBrk="0" fontAlgn="base" hangingPunct="0">
+              <a:spcBef>
+                <a:spcPct val="0"/>
+              </a:spcBef>
+              <a:spcAft>
+                <a:spcPct val="0"/>
+              </a:spcAft>
+              <a:buFont typeface="Arial" panose="020B0604020202020204" pitchFamily="34" charset="0"/>
+              <a:buChar char="•"/>
+            </a:pPr>
+            <a:r>
+              <a:rPr kumimoji="0" lang="en-US" altLang="en-US" sz="1000" b="0" i="0" u="none" strike="noStrike" cap="none" normalizeH="0" baseline="0" dirty="0">
+                <a:ln>
+                  <a:noFill/>
+                </a:ln>
+                <a:solidFill>
+                  <a:srgbClr val="000000"/>
+                </a:solidFill>
+                <a:effectLst/>
+                <a:latin typeface="Arial Unicode MS"/>
+              </a:rPr>
+              <a:t>An empty application tier for instances in private subnets. If more tiers are required, you can create additional private subnets with unique CIDR ranges.</a:t>
+            </a:r>
+          </a:p>
+          <a:p>
+            <a:pPr marL="171450" indent="-171450" eaLnBrk="0" fontAlgn="base" hangingPunct="0">
+              <a:spcBef>
+                <a:spcPct val="0"/>
+              </a:spcBef>
+              <a:spcAft>
+                <a:spcPct val="0"/>
+              </a:spcAft>
+              <a:buFont typeface="Arial" panose="020B0604020202020204" pitchFamily="34" charset="0"/>
+              <a:buChar char="•"/>
+            </a:pPr>
+            <a:r>
+              <a:rPr kumimoji="0" lang="en-US" altLang="en-US" sz="1000" b="0" i="0" u="none" strike="noStrike" cap="none" normalizeH="0" baseline="0" dirty="0">
+                <a:ln>
+                  <a:noFill/>
+                </a:ln>
+                <a:solidFill>
+                  <a:srgbClr val="000000"/>
+                </a:solidFill>
+                <a:effectLst/>
+                <a:latin typeface="Arial Unicode MS"/>
+              </a:rPr>
+              <a:t>AWS Secrets Manager to securely store credentials used for accessing the {partner-product-short-name} instances.</a:t>
+            </a:r>
+          </a:p>
+          <a:p>
+            <a:pPr marL="171450" indent="-171450" eaLnBrk="0" fontAlgn="base" hangingPunct="0">
+              <a:spcBef>
+                <a:spcPct val="0"/>
+              </a:spcBef>
+              <a:spcAft>
+                <a:spcPct val="0"/>
+              </a:spcAft>
+              <a:buFont typeface="Arial" panose="020B0604020202020204" pitchFamily="34" charset="0"/>
+              <a:buChar char="•"/>
+            </a:pPr>
+            <a:r>
+              <a:rPr kumimoji="0" lang="en-US" altLang="en-US" sz="1000" b="0" i="0" u="none" strike="noStrike" cap="none" normalizeH="0" baseline="0" dirty="0">
+                <a:ln>
+                  <a:noFill/>
+                </a:ln>
+                <a:solidFill>
+                  <a:srgbClr val="000000"/>
+                </a:solidFill>
+                <a:effectLst/>
+                <a:latin typeface="Arial Unicode MS"/>
+              </a:rPr>
+              <a:t>AWS Systems Manager to automate the deployment of the {partner-product-short-name} Auto Scaling group.</a:t>
+            </a:r>
+            <a:r>
+              <a:rPr kumimoji="0" lang="en-US" altLang="en-US" sz="800" b="0" i="0" u="none" strike="noStrike" cap="none" normalizeH="0" baseline="0" dirty="0">
+                <a:ln>
+                  <a:noFill/>
+                </a:ln>
+                <a:solidFill>
+                  <a:schemeClr val="tx1"/>
+                </a:solidFill>
+                <a:effectLst/>
+              </a:rPr>
+              <a:t> </a:t>
+            </a:r>
+          </a:p>
+          <a:p>
+            <a:pPr marL="171450" indent="-171450" eaLnBrk="0" fontAlgn="base" hangingPunct="0">
+              <a:spcBef>
+                <a:spcPct val="0"/>
+              </a:spcBef>
+              <a:spcAft>
+                <a:spcPct val="0"/>
+              </a:spcAft>
+              <a:buFont typeface="Arial" panose="020B0604020202020204" pitchFamily="34" charset="0"/>
+              <a:buChar char="•"/>
+            </a:pPr>
+            <a:endParaRPr lang="en-US" altLang="en-US" sz="800" dirty="0">
+              <a:latin typeface="Arial" panose="020B0604020202020204" pitchFamily="34" charset="0"/>
+            </a:endParaRPr>
+          </a:p>
+          <a:p>
+            <a:pPr eaLnBrk="0" fontAlgn="base" hangingPunct="0">
+              <a:spcBef>
+                <a:spcPct val="0"/>
+              </a:spcBef>
+              <a:spcAft>
+                <a:spcPct val="0"/>
+              </a:spcAft>
+            </a:pPr>
+            <a:r>
+              <a:rPr kumimoji="0" lang="en-US" altLang="en-US" sz="800" b="0" i="0" u="none" strike="noStrike" cap="none" normalizeH="0" baseline="0" dirty="0">
+                <a:ln>
+                  <a:noFill/>
+                </a:ln>
+                <a:solidFill>
+                  <a:schemeClr val="tx1"/>
+                </a:solidFill>
+                <a:effectLst/>
+                <a:latin typeface="Arial" panose="020B0604020202020204" pitchFamily="34" charset="0"/>
+              </a:rPr>
+              <a:t>* The template that deploys this Partner Solution into an existing VPC skips the components marked by asterisks and prompts you for your existing VPC configuration.</a:t>
+            </a:r>
+            <a:endParaRPr kumimoji="0" lang="en-US" altLang="en-US" b="0" i="0" u="none" strike="noStrike" cap="none" normalizeH="0" baseline="0" dirty="0">
+              <a:ln>
+                <a:noFill/>
+              </a:ln>
+              <a:solidFill>
+                <a:schemeClr val="tx1"/>
+              </a:solidFill>
+              <a:effectLst/>
+              <a:latin typeface="Arial" panose="020B0604020202020204" pitchFamily="34" charset="0"/>
+            </a:endParaRPr>
+          </a:p>
+        </p:txBody>
+      </p:sp>
+    </p:spTree>
+    <p:extLst>
+      <p:ext uri="{BB962C8B-B14F-4D97-AF65-F5344CB8AC3E}">
+        <p14:creationId xmlns:p14="http://schemas.microsoft.com/office/powerpoint/2010/main" val="2274146009"/>
       </p:ext>
     </p:extLst>
   </p:cSld>

</xml_diff>